<commit_message>
Updated presentation with more pics
</commit_message>
<xml_diff>
--- a/chainreaction_pitch_2018_02_03_18-00-00.pptx
+++ b/chainreaction_pitch_2018_02_03_18-00-00.pptx
@@ -10324,88 +10324,9 @@
         </p:spPr>
         <p:txBody>
           <a:bodyPr>
-            <a:normAutofit lnSpcReduction="10000"/>
+            <a:normAutofit/>
           </a:bodyPr>
           <a:lstStyle/>
-          <a:p>
-            <a:r>
-              <a:rPr lang="de-DE" dirty="0" err="1"/>
-              <a:t>Git</a:t>
-            </a:r>
-            <a:r>
-              <a:rPr lang="de-DE" dirty="0"/>
-              <a:t> Repository (</a:t>
-            </a:r>
-            <a:r>
-              <a:rPr lang="de-DE" dirty="0" err="1"/>
-              <a:t>Github</a:t>
-            </a:r>
-            <a:r>
-              <a:rPr lang="de-DE" dirty="0"/>
-              <a:t>)</a:t>
-            </a:r>
-          </a:p>
-          <a:p>
-            <a:r>
-              <a:rPr lang="de-DE" dirty="0"/>
-              <a:t>Implementation</a:t>
-            </a:r>
-          </a:p>
-          <a:p>
-            <a:pPr lvl="1"/>
-            <a:r>
-              <a:rPr lang="de-DE" dirty="0"/>
-              <a:t>Python</a:t>
-            </a:r>
-          </a:p>
-          <a:p>
-            <a:pPr lvl="2"/>
-            <a:r>
-              <a:rPr lang="de-DE" dirty="0"/>
-              <a:t>Wallet</a:t>
-            </a:r>
-          </a:p>
-          <a:p>
-            <a:pPr lvl="2"/>
-            <a:r>
-              <a:rPr lang="de-DE" dirty="0"/>
-              <a:t>Controller // Management Unit</a:t>
-            </a:r>
-          </a:p>
-          <a:p>
-            <a:pPr lvl="1"/>
-            <a:r>
-              <a:rPr lang="de-DE" dirty="0" err="1"/>
-              <a:t>Jquery</a:t>
-            </a:r>
-            <a:r>
-              <a:rPr lang="de-DE" dirty="0"/>
-              <a:t>/JS: Web UI</a:t>
-            </a:r>
-          </a:p>
-          <a:p>
-            <a:pPr lvl="1"/>
-            <a:r>
-              <a:rPr lang="de-DE" dirty="0" err="1"/>
-              <a:t>Solidity</a:t>
-            </a:r>
-            <a:r>
-              <a:rPr lang="de-DE" dirty="0"/>
-              <a:t>: Smart </a:t>
-            </a:r>
-            <a:r>
-              <a:rPr lang="de-DE" dirty="0" err="1"/>
-              <a:t>Contracts</a:t>
-            </a:r>
-            <a:endParaRPr lang="de-DE" dirty="0"/>
-          </a:p>
-          <a:p>
-            <a:pPr lvl="1"/>
-            <a:r>
-              <a:rPr lang="de-DE" dirty="0"/>
-              <a:t>REST APIs</a:t>
-            </a:r>
-          </a:p>
           <a:p>
             <a:r>
               <a:rPr lang="de-DE" dirty="0" err="1"/>
@@ -10487,7 +10408,7 @@
         </p:blipFill>
         <p:spPr>
           <a:xfrm>
-            <a:off x="7534552" y="1429241"/>
+            <a:off x="6918536" y="4464031"/>
             <a:ext cx="1758279" cy="1758279"/>
           </a:xfrm>
           <a:prstGeom prst="rect">
@@ -10497,10 +10418,10 @@
       </p:pic>
       <p:pic>
         <p:nvPicPr>
-          <p:cNvPr id="6" name="Grafik 5">
+          <p:cNvPr id="3" name="Grafik 2">
             <a:extLst>
               <a:ext uri="{FF2B5EF4-FFF2-40B4-BE49-F238E27FC236}">
-                <a16:creationId xmlns:a16="http://schemas.microsoft.com/office/drawing/2014/main" id="{82F4E7F3-1178-FC45-AAE9-884F59772318}"/>
+                <a16:creationId xmlns:a16="http://schemas.microsoft.com/office/drawing/2014/main" id="{C56BD689-3EFF-3B4F-AD40-43F5B4C09D4F}"/>
               </a:ext>
             </a:extLst>
           </p:cNvPr>
@@ -10517,8 +10438,8 @@
         </p:blipFill>
         <p:spPr>
           <a:xfrm>
-            <a:off x="6202681" y="2734693"/>
-            <a:ext cx="1595718" cy="1595718"/>
+            <a:off x="9816250" y="2114975"/>
+            <a:ext cx="2215436" cy="2215436"/>
           </a:xfrm>
           <a:prstGeom prst="rect">
             <a:avLst/>
@@ -10527,10 +10448,10 @@
       </p:pic>
       <p:pic>
         <p:nvPicPr>
-          <p:cNvPr id="3" name="Grafik 2">
+          <p:cNvPr id="11" name="Grafik 10">
             <a:extLst>
               <a:ext uri="{FF2B5EF4-FFF2-40B4-BE49-F238E27FC236}">
-                <a16:creationId xmlns:a16="http://schemas.microsoft.com/office/drawing/2014/main" id="{C56BD689-3EFF-3B4F-AD40-43F5B4C09D4F}"/>
+                <a16:creationId xmlns:a16="http://schemas.microsoft.com/office/drawing/2014/main" id="{91F5945C-FCD8-9943-A8EE-EC237CBE6358}"/>
               </a:ext>
             </a:extLst>
           </p:cNvPr>
@@ -10540,15 +10461,179 @@
           <p:nvPr/>
         </p:nvPicPr>
         <p:blipFill>
-          <a:blip r:embed="rId5"/>
+          <a:blip r:embed="rId5">
+            <a:clrChange>
+              <a:clrFrom>
+                <a:srgbClr val="F8F9FA"/>
+              </a:clrFrom>
+              <a:clrTo>
+                <a:srgbClr val="F8F9FA">
+                  <a:alpha val="0"/>
+                </a:srgbClr>
+              </a:clrTo>
+            </a:clrChange>
+          </a:blip>
           <a:stretch>
             <a:fillRect/>
           </a:stretch>
         </p:blipFill>
         <p:spPr>
           <a:xfrm>
-            <a:off x="9816250" y="2114975"/>
-            <a:ext cx="2215436" cy="2215436"/>
+            <a:off x="5337780" y="1215753"/>
+            <a:ext cx="4953669" cy="1374157"/>
+          </a:xfrm>
+          <a:prstGeom prst="rect">
+            <a:avLst/>
+          </a:prstGeom>
+        </p:spPr>
+      </p:pic>
+      <p:pic>
+        <p:nvPicPr>
+          <p:cNvPr id="13" name="Grafik 12">
+            <a:extLst>
+              <a:ext uri="{FF2B5EF4-FFF2-40B4-BE49-F238E27FC236}">
+                <a16:creationId xmlns:a16="http://schemas.microsoft.com/office/drawing/2014/main" id="{A7FA8DB7-CEA1-7945-BAAA-401AFC5DF9AD}"/>
+              </a:ext>
+            </a:extLst>
+          </p:cNvPr>
+          <p:cNvPicPr>
+            <a:picLocks noChangeAspect="1"/>
+          </p:cNvPicPr>
+          <p:nvPr/>
+        </p:nvPicPr>
+        <p:blipFill>
+          <a:blip r:embed="rId6"/>
+          <a:stretch>
+            <a:fillRect/>
+          </a:stretch>
+        </p:blipFill>
+        <p:spPr>
+          <a:xfrm>
+            <a:off x="854709" y="4915977"/>
+            <a:ext cx="1473772" cy="1668030"/>
+          </a:xfrm>
+          <a:prstGeom prst="rect">
+            <a:avLst/>
+          </a:prstGeom>
+        </p:spPr>
+      </p:pic>
+      <p:pic>
+        <p:nvPicPr>
+          <p:cNvPr id="14" name="Grafik 13">
+            <a:extLst>
+              <a:ext uri="{FF2B5EF4-FFF2-40B4-BE49-F238E27FC236}">
+                <a16:creationId xmlns:a16="http://schemas.microsoft.com/office/drawing/2014/main" id="{820168E1-98AF-224A-9188-A395FF170220}"/>
+              </a:ext>
+            </a:extLst>
+          </p:cNvPr>
+          <p:cNvPicPr>
+            <a:picLocks noChangeAspect="1"/>
+          </p:cNvPicPr>
+          <p:nvPr/>
+        </p:nvPicPr>
+        <p:blipFill>
+          <a:blip r:embed="rId7">
+            <a:clrChange>
+              <a:clrFrom>
+                <a:srgbClr val="F8F9FA"/>
+              </a:clrFrom>
+              <a:clrTo>
+                <a:srgbClr val="F8F9FA">
+                  <a:alpha val="0"/>
+                </a:srgbClr>
+              </a:clrTo>
+            </a:clrChange>
+          </a:blip>
+          <a:stretch>
+            <a:fillRect/>
+          </a:stretch>
+        </p:blipFill>
+        <p:spPr>
+          <a:xfrm>
+            <a:off x="2800124" y="5150677"/>
+            <a:ext cx="4093773" cy="1048959"/>
+          </a:xfrm>
+          <a:prstGeom prst="rect">
+            <a:avLst/>
+          </a:prstGeom>
+        </p:spPr>
+      </p:pic>
+      <p:pic>
+        <p:nvPicPr>
+          <p:cNvPr id="15" name="Grafik 14">
+            <a:extLst>
+              <a:ext uri="{FF2B5EF4-FFF2-40B4-BE49-F238E27FC236}">
+                <a16:creationId xmlns:a16="http://schemas.microsoft.com/office/drawing/2014/main" id="{20742597-BB83-A84D-96DB-25D5A8CB9A03}"/>
+              </a:ext>
+            </a:extLst>
+          </p:cNvPr>
+          <p:cNvPicPr>
+            <a:picLocks noChangeAspect="1"/>
+          </p:cNvPicPr>
+          <p:nvPr/>
+        </p:nvPicPr>
+        <p:blipFill>
+          <a:blip r:embed="rId8">
+            <a:clrChange>
+              <a:clrFrom>
+                <a:srgbClr val="FFFFFF"/>
+              </a:clrFrom>
+              <a:clrTo>
+                <a:srgbClr val="FFFFFF">
+                  <a:alpha val="0"/>
+                </a:srgbClr>
+              </a:clrTo>
+            </a:clrChange>
+          </a:blip>
+          <a:stretch>
+            <a:fillRect/>
+          </a:stretch>
+        </p:blipFill>
+        <p:spPr>
+          <a:xfrm>
+            <a:off x="8159121" y="3087490"/>
+            <a:ext cx="1484043" cy="2195330"/>
+          </a:xfrm>
+          <a:prstGeom prst="rect">
+            <a:avLst/>
+          </a:prstGeom>
+        </p:spPr>
+      </p:pic>
+      <p:pic>
+        <p:nvPicPr>
+          <p:cNvPr id="16" name="Grafik 15">
+            <a:extLst>
+              <a:ext uri="{FF2B5EF4-FFF2-40B4-BE49-F238E27FC236}">
+                <a16:creationId xmlns:a16="http://schemas.microsoft.com/office/drawing/2014/main" id="{528C9F79-1F6E-F346-826F-A2F24F381FF7}"/>
+              </a:ext>
+            </a:extLst>
+          </p:cNvPr>
+          <p:cNvPicPr>
+            <a:picLocks noChangeAspect="1"/>
+          </p:cNvPicPr>
+          <p:nvPr/>
+        </p:nvPicPr>
+        <p:blipFill>
+          <a:blip r:embed="rId9">
+            <a:clrChange>
+              <a:clrFrom>
+                <a:srgbClr val="F8F9FA"/>
+              </a:clrFrom>
+              <a:clrTo>
+                <a:srgbClr val="F8F9FA">
+                  <a:alpha val="0"/>
+                </a:srgbClr>
+              </a:clrTo>
+            </a:clrChange>
+          </a:blip>
+          <a:stretch>
+            <a:fillRect/>
+          </a:stretch>
+        </p:blipFill>
+        <p:spPr>
+          <a:xfrm>
+            <a:off x="3728588" y="2695573"/>
+            <a:ext cx="3300600" cy="1361414"/>
           </a:xfrm>
           <a:prstGeom prst="rect">
             <a:avLst/>

</xml_diff>